<commit_message>
updated appendix in presentation
</commit_message>
<xml_diff>
--- a/Credit_Risk_Analysis_Presentation.pptx
+++ b/Credit_Risk_Analysis_Presentation.pptx
@@ -7402,6 +7402,42 @@
           <a:bodyPr/>
           <a:lstStyle/>
           <a:p>
+            <a:r>
+              <a:rPr lang="en-US" dirty="0">
+                <a:hlinkClick r:id="rId2"/>
+              </a:rPr>
+              <a:t>Project Developer </a:t>
+            </a:r>
+            <a:r>
+              <a:rPr lang="en-US" dirty="0" err="1">
+                <a:hlinkClick r:id="rId2"/>
+              </a:rPr>
+              <a:t>LinkTree</a:t>
+            </a:r>
+            <a:endParaRPr lang="en-US" dirty="0"/>
+          </a:p>
+          <a:p>
+            <a:r>
+              <a:rPr lang="en-US" dirty="0">
+                <a:hlinkClick r:id="rId3"/>
+              </a:rPr>
+              <a:t>Link to project </a:t>
+            </a:r>
+            <a:r>
+              <a:rPr lang="en-US" dirty="0" err="1">
+                <a:hlinkClick r:id="rId3"/>
+              </a:rPr>
+              <a:t>Github</a:t>
+            </a:r>
+            <a:endParaRPr lang="en-US" dirty="0"/>
+          </a:p>
+          <a:p>
+            <a:r>
+              <a:rPr lang="en-US" dirty="0">
+                <a:hlinkClick r:id="rId4"/>
+              </a:rPr>
+              <a:t>Link to original data source</a:t>
+            </a:r>
             <a:endParaRPr lang="en-US" dirty="0"/>
           </a:p>
         </p:txBody>

</xml_diff>